<commit_message>
Updates to fast density doc to reflect changes due to adaptive thresholding.
</commit_message>
<xml_diff>
--- a/_static/resources/fast_density_fig_1.pptx
+++ b/_static/resources/fast_density_fig_1.pptx
@@ -104,6 +104,11 @@
       </a:defRPr>
     </a:lvl9pPr>
   </p:defaultTextStyle>
+  <p:extLst>
+    <p:ext uri="{EFAFB233-063F-42B5-8137-9DF3F51BA10A}">
+      <p15:sldGuideLst xmlns:p15="http://schemas.microsoft.com/office/powerpoint/2012/main"/>
+    </p:ext>
+  </p:extLst>
 </p:presentation>
 </file>
 
@@ -254,7 +259,7 @@
           <a:p>
             <a:fld id="{42C9EDBD-EA8A-4B0B-B7FD-CE7F7F30DEC4}" type="datetimeFigureOut">
               <a:rPr lang="en-US" smtClean="0"/>
-              <a:t>2024-01-08</a:t>
+              <a:t>2025-01-17</a:t>
             </a:fld>
             <a:endParaRPr lang="en-US"/>
           </a:p>
@@ -452,7 +457,7 @@
           <a:p>
             <a:fld id="{42C9EDBD-EA8A-4B0B-B7FD-CE7F7F30DEC4}" type="datetimeFigureOut">
               <a:rPr lang="en-US" smtClean="0"/>
-              <a:t>2024-01-08</a:t>
+              <a:t>2025-01-17</a:t>
             </a:fld>
             <a:endParaRPr lang="en-US"/>
           </a:p>
@@ -660,7 +665,7 @@
           <a:p>
             <a:fld id="{42C9EDBD-EA8A-4B0B-B7FD-CE7F7F30DEC4}" type="datetimeFigureOut">
               <a:rPr lang="en-US" smtClean="0"/>
-              <a:t>2024-01-08</a:t>
+              <a:t>2025-01-17</a:t>
             </a:fld>
             <a:endParaRPr lang="en-US"/>
           </a:p>
@@ -858,7 +863,7 @@
           <a:p>
             <a:fld id="{42C9EDBD-EA8A-4B0B-B7FD-CE7F7F30DEC4}" type="datetimeFigureOut">
               <a:rPr lang="en-US" smtClean="0"/>
-              <a:t>2024-01-08</a:t>
+              <a:t>2025-01-17</a:t>
             </a:fld>
             <a:endParaRPr lang="en-US"/>
           </a:p>
@@ -1133,7 +1138,7 @@
           <a:p>
             <a:fld id="{42C9EDBD-EA8A-4B0B-B7FD-CE7F7F30DEC4}" type="datetimeFigureOut">
               <a:rPr lang="en-US" smtClean="0"/>
-              <a:t>2024-01-08</a:t>
+              <a:t>2025-01-17</a:t>
             </a:fld>
             <a:endParaRPr lang="en-US"/>
           </a:p>
@@ -1398,7 +1403,7 @@
           <a:p>
             <a:fld id="{42C9EDBD-EA8A-4B0B-B7FD-CE7F7F30DEC4}" type="datetimeFigureOut">
               <a:rPr lang="en-US" smtClean="0"/>
-              <a:t>2024-01-08</a:t>
+              <a:t>2025-01-17</a:t>
             </a:fld>
             <a:endParaRPr lang="en-US"/>
           </a:p>
@@ -1810,7 +1815,7 @@
           <a:p>
             <a:fld id="{42C9EDBD-EA8A-4B0B-B7FD-CE7F7F30DEC4}" type="datetimeFigureOut">
               <a:rPr lang="en-US" smtClean="0"/>
-              <a:t>2024-01-08</a:t>
+              <a:t>2025-01-17</a:t>
             </a:fld>
             <a:endParaRPr lang="en-US"/>
           </a:p>
@@ -1951,7 +1956,7 @@
           <a:p>
             <a:fld id="{42C9EDBD-EA8A-4B0B-B7FD-CE7F7F30DEC4}" type="datetimeFigureOut">
               <a:rPr lang="en-US" smtClean="0"/>
-              <a:t>2024-01-08</a:t>
+              <a:t>2025-01-17</a:t>
             </a:fld>
             <a:endParaRPr lang="en-US"/>
           </a:p>
@@ -2064,7 +2069,7 @@
           <a:p>
             <a:fld id="{42C9EDBD-EA8A-4B0B-B7FD-CE7F7F30DEC4}" type="datetimeFigureOut">
               <a:rPr lang="en-US" smtClean="0"/>
-              <a:t>2024-01-08</a:t>
+              <a:t>2025-01-17</a:t>
             </a:fld>
             <a:endParaRPr lang="en-US"/>
           </a:p>
@@ -2375,7 +2380,7 @@
           <a:p>
             <a:fld id="{42C9EDBD-EA8A-4B0B-B7FD-CE7F7F30DEC4}" type="datetimeFigureOut">
               <a:rPr lang="en-US" smtClean="0"/>
-              <a:t>2024-01-08</a:t>
+              <a:t>2025-01-17</a:t>
             </a:fld>
             <a:endParaRPr lang="en-US"/>
           </a:p>
@@ -2663,7 +2668,7 @@
           <a:p>
             <a:fld id="{42C9EDBD-EA8A-4B0B-B7FD-CE7F7F30DEC4}" type="datetimeFigureOut">
               <a:rPr lang="en-US" smtClean="0"/>
-              <a:t>2024-01-08</a:t>
+              <a:t>2025-01-17</a:t>
             </a:fld>
             <a:endParaRPr lang="en-US"/>
           </a:p>
@@ -2904,7 +2909,7 @@
           <a:p>
             <a:fld id="{42C9EDBD-EA8A-4B0B-B7FD-CE7F7F30DEC4}" type="datetimeFigureOut">
               <a:rPr lang="en-US" smtClean="0"/>
-              <a:t>2024-01-08</a:t>
+              <a:t>2025-01-17</a:t>
             </a:fld>
             <a:endParaRPr lang="en-US"/>
           </a:p>
@@ -3323,10 +3328,10 @@
       </p:grpSpPr>
       <p:pic>
         <p:nvPicPr>
-          <p:cNvPr id="5" name="Picture 4">
-            <a:extLst>
-              <a:ext uri="{FF2B5EF4-FFF2-40B4-BE49-F238E27FC236}">
-                <a16:creationId xmlns:a16="http://schemas.microsoft.com/office/drawing/2014/main" id="{22122CF6-39BE-2000-6BB1-0FF19967DD9C}"/>
+          <p:cNvPr id="3" name="Obraz 2">
+            <a:extLst>
+              <a:ext uri="{FF2B5EF4-FFF2-40B4-BE49-F238E27FC236}">
+                <a16:creationId xmlns:a16="http://schemas.microsoft.com/office/drawing/2014/main" id="{3D97772B-CC5D-3967-AC61-FC9192ED60AB}"/>
               </a:ext>
             </a:extLst>
           </p:cNvPr>
@@ -3336,15 +3341,23 @@
           <p:nvPr/>
         </p:nvPicPr>
         <p:blipFill>
-          <a:blip r:embed="rId2"/>
+          <a:blip r:embed="rId2">
+            <a:duotone>
+              <a:schemeClr val="accent1">
+                <a:shade val="45000"/>
+                <a:satMod val="135000"/>
+              </a:schemeClr>
+              <a:prstClr val="white"/>
+            </a:duotone>
+          </a:blip>
           <a:stretch>
             <a:fillRect/>
           </a:stretch>
         </p:blipFill>
         <p:spPr>
           <a:xfrm>
-            <a:off x="11018" y="0"/>
-            <a:ext cx="10463084" cy="6858000"/>
+            <a:off x="320233" y="181628"/>
+            <a:ext cx="10467025" cy="3854558"/>
           </a:xfrm>
           <a:prstGeom prst="rect">
             <a:avLst/>
@@ -3365,7 +3378,7 @@
         </p:nvSpPr>
         <p:spPr>
           <a:xfrm>
-            <a:off x="7040880" y="2461260"/>
+            <a:off x="7397871" y="2724306"/>
             <a:ext cx="708660" cy="324000"/>
           </a:xfrm>
           <a:prstGeom prst="ellipse">
@@ -3417,7 +3430,7 @@
         </p:nvSpPr>
         <p:spPr>
           <a:xfrm>
-            <a:off x="8945880" y="6096000"/>
+            <a:off x="9284082" y="3515644"/>
             <a:ext cx="1363980" cy="324000"/>
           </a:xfrm>
           <a:prstGeom prst="ellipse">
@@ -3427,6 +3440,58 @@
           <a:ln>
             <a:solidFill>
               <a:srgbClr val="FFFF00"/>
+            </a:solidFill>
+          </a:ln>
+        </p:spPr>
+        <p:style>
+          <a:lnRef idx="2">
+            <a:schemeClr val="accent1">
+              <a:shade val="50000"/>
+            </a:schemeClr>
+          </a:lnRef>
+          <a:fillRef idx="1">
+            <a:schemeClr val="accent1"/>
+          </a:fillRef>
+          <a:effectRef idx="0">
+            <a:schemeClr val="accent1"/>
+          </a:effectRef>
+          <a:fontRef idx="minor">
+            <a:schemeClr val="lt1"/>
+          </a:fontRef>
+        </p:style>
+        <p:txBody>
+          <a:bodyPr rtlCol="0" anchor="ctr"/>
+          <a:lstStyle/>
+          <a:p>
+            <a:pPr algn="ctr"/>
+            <a:endParaRPr lang="en-US"/>
+          </a:p>
+        </p:txBody>
+      </p:sp>
+      <p:sp>
+        <p:nvSpPr>
+          <p:cNvPr id="4" name="Oval 6">
+            <a:extLst>
+              <a:ext uri="{FF2B5EF4-FFF2-40B4-BE49-F238E27FC236}">
+                <a16:creationId xmlns:a16="http://schemas.microsoft.com/office/drawing/2014/main" id="{C9CA8672-98E8-46C0-BB49-E3777B43D578}"/>
+              </a:ext>
+            </a:extLst>
+          </p:cNvPr>
+          <p:cNvSpPr/>
+          <p:nvPr/>
+        </p:nvSpPr>
+        <p:spPr>
+          <a:xfrm>
+            <a:off x="6755918" y="649278"/>
+            <a:ext cx="1363980" cy="324000"/>
+          </a:xfrm>
+          <a:prstGeom prst="ellipse">
+            <a:avLst/>
+          </a:prstGeom>
+          <a:noFill/>
+          <a:ln>
+            <a:solidFill>
+              <a:srgbClr val="00B0F0"/>
             </a:solidFill>
           </a:ln>
         </p:spPr>

</xml_diff>